<commit_message>
Data quản lí bình bầu
</commit_message>
<xml_diff>
--- a/Report/TÌM HIỂU VỀ MÃ HÓA Trong oracle.pptx
+++ b/Report/TÌM HIỂU VỀ MÃ HÓA Trong oracle.pptx
@@ -26,6 +26,7 @@
     <p:sldId id="275" r:id="rId20"/>
     <p:sldId id="276" r:id="rId21"/>
     <p:sldId id="277" r:id="rId22"/>
+    <p:sldId id="278" r:id="rId23"/>
   </p:sldIdLst>
   <p:sldSz cx="12192000" cy="6858000"/>
   <p:notesSz cx="6858000" cy="9144000"/>
@@ -124,6 +125,11 @@
       </a:defRPr>
     </a:lvl9pPr>
   </p:defaultTextStyle>
+  <p:extLst>
+    <p:ext uri="{EFAFB233-063F-42B5-8137-9DF3F51BA10A}">
+      <p15:sldGuideLst xmlns:p15="http://schemas.microsoft.com/office/powerpoint/2012/main"/>
+    </p:ext>
+  </p:extLst>
 </p:presentation>
 </file>
 
@@ -3914,6 +3920,41 @@
           </a:prstGeom>
         </p:spPr>
       </p:pic>
+      <p:sp>
+        <p:nvSpPr>
+          <p:cNvPr id="3" name="Hộp Văn bản 2">
+            <a:extLst>
+              <a:ext uri="{FF2B5EF4-FFF2-40B4-BE49-F238E27FC236}">
+                <a16:creationId xmlns:a16="http://schemas.microsoft.com/office/drawing/2014/main" id="{D5520013-E93C-4D7D-AF55-7EE0F7991A69}"/>
+              </a:ext>
+            </a:extLst>
+          </p:cNvPr>
+          <p:cNvSpPr txBox="1"/>
+          <p:nvPr/>
+        </p:nvSpPr>
+        <p:spPr>
+          <a:xfrm>
+            <a:off x="5244243" y="2033779"/>
+            <a:ext cx="1667444" cy="461665"/>
+          </a:xfrm>
+          <a:prstGeom prst="rect">
+            <a:avLst/>
+          </a:prstGeom>
+          <a:noFill/>
+        </p:spPr>
+        <p:txBody>
+          <a:bodyPr wrap="none" rtlCol="0">
+            <a:spAutoFit/>
+          </a:bodyPr>
+          <a:lstStyle/>
+          <a:p>
+            <a:r>
+              <a:rPr lang="en-US" sz="2400" b="1" dirty="0"/>
+              <a:t>NHÓM 22</a:t>
+            </a:r>
+          </a:p>
+        </p:txBody>
+      </p:sp>
     </p:spTree>
     <p:extLst>
       <p:ext uri="{BB962C8B-B14F-4D97-AF65-F5344CB8AC3E}">
@@ -8920,7 +8961,7 @@
         </p:nvSpPr>
         <p:spPr>
           <a:xfrm>
-            <a:off x="3299792" y="5955789"/>
+            <a:off x="3299792" y="6136231"/>
             <a:ext cx="7924797" cy="400110"/>
           </a:xfrm>
           <a:prstGeom prst="rect">
@@ -9087,10 +9128,241 @@
         </p:nvSpPr>
         <p:spPr/>
         <p:txBody>
-          <a:bodyPr/>
+          <a:bodyPr>
+            <a:normAutofit/>
+          </a:bodyPr>
           <a:lstStyle/>
           <a:p>
-            <a:endParaRPr lang="en-US"/>
+            <a:r>
+              <a:rPr lang="en-US" sz="2000" dirty="0" err="1"/>
+              <a:t>B</a:t>
+            </a:r>
+            <a:r>
+              <a:rPr lang="en-US" sz="2800" dirty="0" err="1"/>
+              <a:t>ảo</a:t>
+            </a:r>
+            <a:r>
+              <a:rPr lang="en-US" sz="2800" dirty="0"/>
+              <a:t> </a:t>
+            </a:r>
+            <a:r>
+              <a:rPr lang="en-US" sz="2800" dirty="0" err="1"/>
+              <a:t>mật</a:t>
+            </a:r>
+            <a:r>
+              <a:rPr lang="en-US" sz="2800" dirty="0"/>
+              <a:t> password</a:t>
+            </a:r>
+          </a:p>
+          <a:p>
+            <a:r>
+              <a:rPr lang="en-US" sz="2800" dirty="0" err="1"/>
+              <a:t>Bảo</a:t>
+            </a:r>
+            <a:r>
+              <a:rPr lang="en-US" sz="2800" dirty="0"/>
+              <a:t> </a:t>
+            </a:r>
+            <a:r>
+              <a:rPr lang="en-US" sz="2800" dirty="0" err="1"/>
+              <a:t>mật</a:t>
+            </a:r>
+            <a:r>
+              <a:rPr lang="en-US" sz="2800" dirty="0"/>
+              <a:t> </a:t>
+            </a:r>
+            <a:r>
+              <a:rPr lang="en-US" sz="2800" dirty="0" err="1"/>
+              <a:t>số</a:t>
+            </a:r>
+            <a:r>
+              <a:rPr lang="en-US" sz="2800" dirty="0"/>
+              <a:t> </a:t>
+            </a:r>
+            <a:r>
+              <a:rPr lang="en-US" sz="2800" dirty="0" err="1"/>
+              <a:t>tài</a:t>
+            </a:r>
+            <a:r>
+              <a:rPr lang="en-US" sz="2800" dirty="0"/>
+              <a:t> </a:t>
+            </a:r>
+            <a:r>
+              <a:rPr lang="en-US" sz="2800" dirty="0" err="1"/>
+              <a:t>khoản</a:t>
+            </a:r>
+            <a:r>
+              <a:rPr lang="en-US" sz="2800" dirty="0"/>
+              <a:t> </a:t>
+            </a:r>
+            <a:r>
+              <a:rPr lang="en-US" sz="2800" dirty="0" err="1"/>
+              <a:t>khi</a:t>
+            </a:r>
+            <a:r>
+              <a:rPr lang="en-US" sz="2800" dirty="0"/>
+              <a:t> </a:t>
+            </a:r>
+            <a:r>
+              <a:rPr lang="en-US" sz="2800" dirty="0" err="1"/>
+              <a:t>giao</a:t>
+            </a:r>
+            <a:r>
+              <a:rPr lang="en-US" sz="2800" dirty="0"/>
+              <a:t> </a:t>
+            </a:r>
+            <a:r>
+              <a:rPr lang="en-US" sz="2800" dirty="0" err="1"/>
+              <a:t>dịch</a:t>
+            </a:r>
+            <a:r>
+              <a:rPr lang="en-US" sz="2800" dirty="0"/>
+              <a:t> </a:t>
+            </a:r>
+            <a:r>
+              <a:rPr lang="en-US" sz="2800" dirty="0" err="1"/>
+              <a:t>chuyển</a:t>
+            </a:r>
+            <a:r>
+              <a:rPr lang="en-US" sz="2800" dirty="0"/>
+              <a:t> </a:t>
+            </a:r>
+            <a:r>
+              <a:rPr lang="en-US" sz="2800" dirty="0" err="1"/>
+              <a:t>tiền</a:t>
+            </a:r>
+            <a:r>
+              <a:rPr lang="en-US" sz="2800" dirty="0"/>
+              <a:t> online.</a:t>
+            </a:r>
+          </a:p>
+          <a:p>
+            <a:r>
+              <a:rPr lang="en-US" sz="2800" dirty="0" err="1"/>
+              <a:t>Chống</a:t>
+            </a:r>
+            <a:r>
+              <a:rPr lang="en-US" sz="2800" dirty="0"/>
+              <a:t> </a:t>
+            </a:r>
+            <a:r>
+              <a:rPr lang="en-US" sz="2800" dirty="0" err="1"/>
+              <a:t>đánh</a:t>
+            </a:r>
+            <a:r>
+              <a:rPr lang="en-US" sz="2800" dirty="0"/>
+              <a:t> </a:t>
+            </a:r>
+            <a:r>
+              <a:rPr lang="en-US" sz="2800" dirty="0" err="1"/>
+              <a:t>cắp</a:t>
+            </a:r>
+            <a:r>
+              <a:rPr lang="en-US" sz="2800" dirty="0"/>
+              <a:t> </a:t>
+            </a:r>
+            <a:r>
+              <a:rPr lang="en-US" sz="2800" dirty="0" err="1"/>
+              <a:t>dữ</a:t>
+            </a:r>
+            <a:r>
+              <a:rPr lang="en-US" sz="2800" dirty="0"/>
+              <a:t> </a:t>
+            </a:r>
+            <a:r>
+              <a:rPr lang="en-US" sz="2800" dirty="0" err="1"/>
+              <a:t>liệu</a:t>
+            </a:r>
+            <a:r>
+              <a:rPr lang="en-US" sz="2800" dirty="0"/>
+              <a:t>.</a:t>
+            </a:r>
+          </a:p>
+          <a:p>
+            <a:r>
+              <a:rPr lang="en-US" sz="2800" dirty="0" err="1"/>
+              <a:t>Chống</a:t>
+            </a:r>
+            <a:r>
+              <a:rPr lang="en-US" sz="2800" dirty="0"/>
+              <a:t> </a:t>
+            </a:r>
+            <a:r>
+              <a:rPr lang="en-US" sz="2800" dirty="0" err="1"/>
+              <a:t>đọc</a:t>
+            </a:r>
+            <a:r>
+              <a:rPr lang="en-US" sz="2800" dirty="0"/>
+              <a:t> </a:t>
+            </a:r>
+            <a:r>
+              <a:rPr lang="en-US" sz="2800" dirty="0" err="1"/>
+              <a:t>lén</a:t>
+            </a:r>
+            <a:r>
+              <a:rPr lang="en-US" sz="2800" dirty="0"/>
+              <a:t> </a:t>
+            </a:r>
+            <a:r>
+              <a:rPr lang="en-US" sz="2800" dirty="0" err="1"/>
+              <a:t>thông</a:t>
+            </a:r>
+            <a:r>
+              <a:rPr lang="en-US" sz="2800" dirty="0"/>
+              <a:t> tin </a:t>
+            </a:r>
+            <a:r>
+              <a:rPr lang="en-US" sz="2800" dirty="0" err="1"/>
+              <a:t>quan</a:t>
+            </a:r>
+            <a:r>
+              <a:rPr lang="en-US" sz="2800" dirty="0"/>
+              <a:t> </a:t>
+            </a:r>
+            <a:r>
+              <a:rPr lang="en-US" sz="2800" dirty="0" err="1"/>
+              <a:t>trọng</a:t>
+            </a:r>
+            <a:r>
+              <a:rPr lang="en-US" sz="2800" dirty="0"/>
+              <a:t> </a:t>
+            </a:r>
+            <a:r>
+              <a:rPr lang="en-US" sz="2800" dirty="0" err="1"/>
+              <a:t>khi</a:t>
+            </a:r>
+            <a:r>
+              <a:rPr lang="en-US" sz="2800" dirty="0"/>
+              <a:t> </a:t>
+            </a:r>
+            <a:r>
+              <a:rPr lang="en-US" sz="2800" dirty="0" err="1"/>
+              <a:t>gửi</a:t>
+            </a:r>
+            <a:r>
+              <a:rPr lang="en-US" sz="2800" dirty="0"/>
+              <a:t> qua đ</a:t>
+            </a:r>
+            <a:r>
+              <a:rPr lang="vi-VN" sz="2800" dirty="0"/>
+              <a:t>ư</a:t>
+            </a:r>
+            <a:r>
+              <a:rPr lang="en-US" sz="2800" dirty="0" err="1"/>
+              <a:t>ờng</a:t>
+            </a:r>
+            <a:r>
+              <a:rPr lang="en-US" sz="2800" dirty="0"/>
+              <a:t> </a:t>
+            </a:r>
+            <a:r>
+              <a:rPr lang="en-US" sz="2800" dirty="0" err="1"/>
+              <a:t>truyền</a:t>
+            </a:r>
+            <a:r>
+              <a:rPr lang="en-US" sz="2800" dirty="0"/>
+              <a:t> internet.</a:t>
+            </a:r>
           </a:p>
         </p:txBody>
       </p:sp>
@@ -9193,97 +9465,97 @@
           <a:lstStyle/>
           <a:p>
             <a:r>
-              <a:rPr lang="en-US" sz="2400" dirty="0" err="1"/>
+              <a:rPr lang="en-US" sz="2800" dirty="0" err="1"/>
               <a:t>Sử</a:t>
             </a:r>
             <a:r>
-              <a:rPr lang="en-US" sz="2400" dirty="0"/>
-              <a:t> </a:t>
-            </a:r>
-            <a:r>
-              <a:rPr lang="en-US" sz="2400" dirty="0" err="1"/>
+              <a:rPr lang="en-US" sz="2800" dirty="0"/>
+              <a:t> </a:t>
+            </a:r>
+            <a:r>
+              <a:rPr lang="en-US" sz="2800" dirty="0" err="1"/>
               <a:t>dụng</a:t>
             </a:r>
             <a:r>
-              <a:rPr lang="en-US" sz="2400" dirty="0"/>
-              <a:t> </a:t>
-            </a:r>
-            <a:r>
-              <a:rPr lang="en-US" sz="2400" dirty="0" err="1"/>
+              <a:rPr lang="en-US" sz="2800" dirty="0"/>
+              <a:t> </a:t>
+            </a:r>
+            <a:r>
+              <a:rPr lang="en-US" sz="2800" dirty="0" err="1"/>
               <a:t>ngữ</a:t>
             </a:r>
             <a:r>
-              <a:rPr lang="en-US" sz="2400" dirty="0"/>
-              <a:t> </a:t>
-            </a:r>
-            <a:r>
-              <a:rPr lang="en-US" sz="2400" dirty="0" err="1"/>
+              <a:rPr lang="en-US" sz="2800" dirty="0"/>
+              <a:t> </a:t>
+            </a:r>
+            <a:r>
+              <a:rPr lang="en-US" sz="2800" dirty="0" err="1"/>
               <a:t>cảnh</a:t>
             </a:r>
             <a:r>
-              <a:rPr lang="en-US" sz="2400" dirty="0"/>
-              <a:t> </a:t>
-            </a:r>
-            <a:r>
-              <a:rPr lang="en-US" sz="2400" dirty="0" err="1"/>
+              <a:rPr lang="en-US" sz="2800" dirty="0"/>
+              <a:t> </a:t>
+            </a:r>
+            <a:r>
+              <a:rPr lang="en-US" sz="2800" dirty="0" err="1"/>
               <a:t>đồ</a:t>
             </a:r>
             <a:r>
-              <a:rPr lang="en-US" sz="2400" dirty="0"/>
-              <a:t> </a:t>
-            </a:r>
-            <a:r>
-              <a:rPr lang="en-US" sz="2400" dirty="0" err="1"/>
+              <a:rPr lang="en-US" sz="2800" dirty="0"/>
+              <a:t> </a:t>
+            </a:r>
+            <a:r>
+              <a:rPr lang="en-US" sz="2800" dirty="0" err="1"/>
               <a:t>án</a:t>
             </a:r>
             <a:r>
-              <a:rPr lang="en-US" sz="2400" dirty="0"/>
-              <a:t> </a:t>
-            </a:r>
-            <a:r>
-              <a:rPr lang="en-US" sz="2400" dirty="0" err="1"/>
+              <a:rPr lang="en-US" sz="2800" dirty="0"/>
+              <a:t> </a:t>
+            </a:r>
+            <a:r>
+              <a:rPr lang="en-US" sz="2800" dirty="0" err="1"/>
               <a:t>cuối</a:t>
             </a:r>
             <a:r>
-              <a:rPr lang="en-US" sz="2400" dirty="0"/>
-              <a:t> </a:t>
-            </a:r>
-            <a:r>
-              <a:rPr lang="en-US" sz="2400" dirty="0" err="1"/>
+              <a:rPr lang="en-US" sz="2800" dirty="0"/>
+              <a:t> </a:t>
+            </a:r>
+            <a:r>
+              <a:rPr lang="en-US" sz="2800" dirty="0" err="1"/>
               <a:t>kì</a:t>
             </a:r>
-            <a:endParaRPr lang="en-US" sz="2400" dirty="0"/>
-          </a:p>
-          <a:p>
-            <a:r>
-              <a:rPr lang="en-US" sz="2400" dirty="0" err="1"/>
+            <a:endParaRPr lang="en-US" sz="2800" dirty="0"/>
+          </a:p>
+          <a:p>
+            <a:r>
+              <a:rPr lang="en-US" sz="2800" dirty="0" err="1"/>
               <a:t>Thực</a:t>
             </a:r>
             <a:r>
-              <a:rPr lang="en-US" sz="2400" dirty="0"/>
-              <a:t> </a:t>
-            </a:r>
-            <a:r>
-              <a:rPr lang="en-US" sz="2400" dirty="0" err="1"/>
+              <a:rPr lang="en-US" sz="2800" dirty="0"/>
+              <a:t> </a:t>
+            </a:r>
+            <a:r>
+              <a:rPr lang="en-US" sz="2800" dirty="0" err="1"/>
               <a:t>hiện</a:t>
             </a:r>
             <a:r>
-              <a:rPr lang="en-US" sz="2400" dirty="0"/>
-              <a:t> </a:t>
-            </a:r>
-            <a:r>
-              <a:rPr lang="en-US" sz="2400" dirty="0" err="1"/>
+              <a:rPr lang="en-US" sz="2800" dirty="0"/>
+              <a:t> </a:t>
+            </a:r>
+            <a:r>
+              <a:rPr lang="en-US" sz="2800" dirty="0" err="1"/>
               <a:t>mã</a:t>
             </a:r>
             <a:r>
-              <a:rPr lang="en-US" sz="2400" dirty="0"/>
-              <a:t> </a:t>
-            </a:r>
-            <a:r>
-              <a:rPr lang="en-US" sz="2400" dirty="0" err="1"/>
+              <a:rPr lang="en-US" sz="2800" dirty="0"/>
+              <a:t> </a:t>
+            </a:r>
+            <a:r>
+              <a:rPr lang="en-US" sz="2800" dirty="0" err="1"/>
               <a:t>hóa</a:t>
             </a:r>
-            <a:endParaRPr lang="en-US" sz="2400" dirty="0"/>
+            <a:endParaRPr lang="en-US" sz="2800" dirty="0"/>
           </a:p>
           <a:p>
             <a:endParaRPr lang="en-US" dirty="0"/>
@@ -10769,6 +11041,7 @@
           </a:bodyPr>
           <a:lstStyle/>
           <a:p>
+            <a:pPr algn="ctr"/>
             <a:r>
               <a:rPr lang="en-US" sz="3200" b="1" dirty="0"/>
               <a:t>Demo</a:t>
@@ -10805,6 +11078,66 @@
     <p:extLst>
       <p:ext uri="{BB962C8B-B14F-4D97-AF65-F5344CB8AC3E}">
         <p14:creationId xmlns:p14="http://schemas.microsoft.com/office/powerpoint/2010/main" val="1891299070"/>
+      </p:ext>
+    </p:extLst>
+  </p:cSld>
+  <p:clrMapOvr>
+    <a:masterClrMapping/>
+  </p:clrMapOvr>
+</p:sld>
+</file>
+
+<file path=ppt/slides/slide22.xml><?xml version="1.0" encoding="utf-8"?>
+<p:sld xmlns:a="http://schemas.openxmlformats.org/drawingml/2006/main" xmlns:r="http://schemas.openxmlformats.org/officeDocument/2006/relationships" xmlns:p="http://schemas.openxmlformats.org/presentationml/2006/main">
+  <p:cSld>
+    <p:spTree>
+      <p:nvGrpSpPr>
+        <p:cNvPr id="1" name=""/>
+        <p:cNvGrpSpPr/>
+        <p:nvPr/>
+      </p:nvGrpSpPr>
+      <p:grpSpPr>
+        <a:xfrm>
+          <a:off x="0" y="0"/>
+          <a:ext cx="0" cy="0"/>
+          <a:chOff x="0" y="0"/>
+          <a:chExt cx="0" cy="0"/>
+        </a:xfrm>
+      </p:grpSpPr>
+      <p:pic>
+        <p:nvPicPr>
+          <p:cNvPr id="5" name="Hình ảnh 4">
+            <a:extLst>
+              <a:ext uri="{FF2B5EF4-FFF2-40B4-BE49-F238E27FC236}">
+                <a16:creationId xmlns:a16="http://schemas.microsoft.com/office/drawing/2014/main" id="{5CB2B3E7-F110-4F96-A681-6B851A7EA938}"/>
+              </a:ext>
+            </a:extLst>
+          </p:cNvPr>
+          <p:cNvPicPr>
+            <a:picLocks noChangeAspect="1"/>
+          </p:cNvPicPr>
+          <p:nvPr/>
+        </p:nvPicPr>
+        <p:blipFill>
+          <a:blip r:embed="rId2"/>
+          <a:stretch>
+            <a:fillRect/>
+          </a:stretch>
+        </p:blipFill>
+        <p:spPr>
+          <a:xfrm>
+            <a:off x="4080217" y="1947203"/>
+            <a:ext cx="4031566" cy="4031566"/>
+          </a:xfrm>
+          <a:prstGeom prst="rect">
+            <a:avLst/>
+          </a:prstGeom>
+        </p:spPr>
+      </p:pic>
+    </p:spTree>
+    <p:extLst>
+      <p:ext uri="{BB962C8B-B14F-4D97-AF65-F5344CB8AC3E}">
+        <p14:creationId xmlns:p14="http://schemas.microsoft.com/office/powerpoint/2010/main" val="2353719849"/>
       </p:ext>
     </p:extLst>
   </p:cSld>
@@ -11086,10 +11419,6 @@
             <a:endParaRPr lang="en-US" sz="2400" dirty="0"/>
           </a:p>
           <a:p>
-            <a:r>
-              <a:rPr lang="en-US" sz="2400" dirty="0"/>
-              <a:t>\</a:t>
-            </a:r>
             <a:r>
               <a:rPr lang="vi-VN" sz="2400" dirty="0"/>
               <a:t>Năm 1949 ông công </a:t>
@@ -13950,10 +14279,280 @@
         </p:nvSpPr>
         <p:spPr/>
         <p:txBody>
-          <a:bodyPr/>
+          <a:bodyPr>
+            <a:normAutofit/>
+          </a:bodyPr>
           <a:lstStyle/>
           <a:p>
-            <a:endParaRPr lang="en-US" dirty="0"/>
+            <a:r>
+              <a:rPr lang="en-US" sz="2400" dirty="0"/>
+              <a:t>Mã </a:t>
+            </a:r>
+            <a:r>
+              <a:rPr lang="en-US" sz="2400" dirty="0" err="1"/>
+              <a:t>hóa</a:t>
+            </a:r>
+            <a:r>
+              <a:rPr lang="en-US" sz="2400" dirty="0"/>
+              <a:t> Không đ</a:t>
+            </a:r>
+            <a:r>
+              <a:rPr lang="vi-VN" sz="2400" dirty="0"/>
+              <a:t>ư</a:t>
+            </a:r>
+            <a:r>
+              <a:rPr lang="en-US" sz="2400" dirty="0" err="1"/>
+              <a:t>ợc</a:t>
+            </a:r>
+            <a:r>
+              <a:rPr lang="en-US" sz="2400" dirty="0"/>
+              <a:t> </a:t>
+            </a:r>
+            <a:r>
+              <a:rPr lang="en-US" sz="2400" dirty="0" err="1"/>
+              <a:t>sử</a:t>
+            </a:r>
+            <a:r>
+              <a:rPr lang="en-US" sz="2400" dirty="0"/>
+              <a:t> </a:t>
+            </a:r>
+            <a:r>
+              <a:rPr lang="en-US" sz="2400" dirty="0" err="1"/>
+              <a:t>dụng</a:t>
+            </a:r>
+            <a:r>
+              <a:rPr lang="en-US" sz="2400" dirty="0"/>
+              <a:t> </a:t>
+            </a:r>
+            <a:r>
+              <a:rPr lang="en-US" sz="2400" dirty="0" err="1"/>
+              <a:t>để</a:t>
+            </a:r>
+            <a:r>
+              <a:rPr lang="en-US" sz="2400" dirty="0"/>
+              <a:t> </a:t>
+            </a:r>
+            <a:r>
+              <a:rPr lang="en-US" sz="2400" dirty="0" err="1"/>
+              <a:t>điểu</a:t>
+            </a:r>
+            <a:r>
+              <a:rPr lang="en-US" sz="2400" dirty="0"/>
+              <a:t> </a:t>
+            </a:r>
+            <a:r>
+              <a:rPr lang="en-US" sz="2400" dirty="0" err="1"/>
+              <a:t>khiển</a:t>
+            </a:r>
+            <a:r>
+              <a:rPr lang="en-US" sz="2400" dirty="0"/>
+              <a:t> </a:t>
+            </a:r>
+            <a:r>
+              <a:rPr lang="en-US" sz="2400" dirty="0" err="1"/>
+              <a:t>truy</a:t>
+            </a:r>
+            <a:r>
+              <a:rPr lang="en-US" sz="2400" dirty="0"/>
+              <a:t> </a:t>
+            </a:r>
+            <a:r>
+              <a:rPr lang="en-US" sz="2400" dirty="0" err="1"/>
+              <a:t>cập</a:t>
+            </a:r>
+            <a:r>
+              <a:rPr lang="en-US" sz="2400" dirty="0"/>
+              <a:t> </a:t>
+            </a:r>
+            <a:r>
+              <a:rPr lang="en-US" sz="2400" dirty="0" err="1"/>
+              <a:t>của</a:t>
+            </a:r>
+            <a:r>
+              <a:rPr lang="en-US" sz="2400" dirty="0"/>
+              <a:t> ng</a:t>
+            </a:r>
+            <a:r>
+              <a:rPr lang="vi-VN" sz="2400" dirty="0"/>
+              <a:t>ư</a:t>
+            </a:r>
+            <a:r>
+              <a:rPr lang="en-US" sz="2400" dirty="0" err="1"/>
+              <a:t>ời</a:t>
+            </a:r>
+            <a:r>
+              <a:rPr lang="en-US" sz="2400" dirty="0"/>
+              <a:t> </a:t>
+            </a:r>
+            <a:r>
+              <a:rPr lang="en-US" sz="2400" dirty="0" err="1"/>
+              <a:t>dùng</a:t>
+            </a:r>
+            <a:endParaRPr lang="en-US" sz="2400" dirty="0"/>
+          </a:p>
+          <a:p>
+            <a:r>
+              <a:rPr lang="en-US" sz="2400" dirty="0"/>
+              <a:t>Mã </a:t>
+            </a:r>
+            <a:r>
+              <a:rPr lang="en-US" sz="2400" dirty="0" err="1"/>
+              <a:t>hóa</a:t>
+            </a:r>
+            <a:r>
+              <a:rPr lang="en-US" sz="2400" dirty="0"/>
+              <a:t> Không </a:t>
+            </a:r>
+            <a:r>
+              <a:rPr lang="en-US" sz="2400" dirty="0" err="1"/>
+              <a:t>ngăn</a:t>
+            </a:r>
+            <a:r>
+              <a:rPr lang="en-US" sz="2400" dirty="0"/>
+              <a:t> </a:t>
+            </a:r>
+            <a:r>
+              <a:rPr lang="en-US" sz="2400" dirty="0" err="1"/>
+              <a:t>chặn</a:t>
+            </a:r>
+            <a:r>
+              <a:rPr lang="en-US" sz="2400" dirty="0"/>
+              <a:t> đ</a:t>
+            </a:r>
+            <a:r>
+              <a:rPr lang="vi-VN" sz="2400" dirty="0"/>
+              <a:t>ư</a:t>
+            </a:r>
+            <a:r>
+              <a:rPr lang="en-US" sz="2400" dirty="0" err="1"/>
+              <a:t>ợc</a:t>
+            </a:r>
+            <a:r>
+              <a:rPr lang="en-US" sz="2400" dirty="0"/>
+              <a:t> ng</a:t>
+            </a:r>
+            <a:r>
+              <a:rPr lang="vi-VN" sz="2400" dirty="0"/>
+              <a:t>ư</a:t>
+            </a:r>
+            <a:r>
+              <a:rPr lang="en-US" sz="2400" dirty="0" err="1"/>
+              <a:t>ời</a:t>
+            </a:r>
+            <a:r>
+              <a:rPr lang="en-US" sz="2400" dirty="0"/>
+              <a:t> </a:t>
+            </a:r>
+            <a:r>
+              <a:rPr lang="en-US" sz="2400" dirty="0" err="1"/>
+              <a:t>quản</a:t>
+            </a:r>
+            <a:r>
+              <a:rPr lang="en-US" sz="2400" dirty="0"/>
+              <a:t> </a:t>
+            </a:r>
+            <a:r>
+              <a:rPr lang="en-US" sz="2400" dirty="0" err="1"/>
+              <a:t>trị</a:t>
+            </a:r>
+            <a:r>
+              <a:rPr lang="en-US" sz="2400" dirty="0"/>
+              <a:t> có ý </a:t>
+            </a:r>
+            <a:r>
+              <a:rPr lang="en-US" sz="2400" dirty="0" err="1"/>
+              <a:t>đồ</a:t>
+            </a:r>
+            <a:r>
+              <a:rPr lang="en-US" sz="2400" dirty="0"/>
+              <a:t> </a:t>
+            </a:r>
+            <a:r>
+              <a:rPr lang="en-US" sz="2400" dirty="0" err="1"/>
+              <a:t>xấu</a:t>
+            </a:r>
+            <a:r>
+              <a:rPr lang="en-US" sz="2400" dirty="0"/>
+              <a:t>.</a:t>
+            </a:r>
+          </a:p>
+          <a:p>
+            <a:r>
+              <a:rPr lang="en-US" sz="2400" dirty="0"/>
+              <a:t>Mã </a:t>
+            </a:r>
+            <a:r>
+              <a:rPr lang="en-US" sz="2400" dirty="0" err="1"/>
+              <a:t>hóa</a:t>
+            </a:r>
+            <a:r>
+              <a:rPr lang="en-US" sz="2400" dirty="0"/>
+              <a:t> </a:t>
+            </a:r>
+            <a:r>
+              <a:rPr lang="en-US" sz="2400" dirty="0" err="1"/>
+              <a:t>mọi</a:t>
+            </a:r>
+            <a:r>
+              <a:rPr lang="en-US" sz="2400" dirty="0"/>
+              <a:t> </a:t>
+            </a:r>
+            <a:r>
+              <a:rPr lang="en-US" sz="2400" dirty="0" err="1"/>
+              <a:t>thứ</a:t>
+            </a:r>
+            <a:r>
+              <a:rPr lang="en-US" sz="2400" dirty="0"/>
+              <a:t> Không </a:t>
+            </a:r>
+            <a:r>
+              <a:rPr lang="en-US" sz="2400" dirty="0" err="1"/>
+              <a:t>làm</a:t>
+            </a:r>
+            <a:r>
+              <a:rPr lang="en-US" sz="2400" dirty="0"/>
+              <a:t> </a:t>
+            </a:r>
+            <a:r>
+              <a:rPr lang="en-US" sz="2400" dirty="0" err="1"/>
+              <a:t>cho</a:t>
+            </a:r>
+            <a:r>
+              <a:rPr lang="en-US" sz="2400" dirty="0"/>
+              <a:t> </a:t>
+            </a:r>
+            <a:r>
+              <a:rPr lang="en-US" sz="2400" dirty="0" err="1"/>
+              <a:t>dữ</a:t>
+            </a:r>
+            <a:r>
+              <a:rPr lang="en-US" sz="2400" dirty="0"/>
+              <a:t> </a:t>
+            </a:r>
+            <a:r>
+              <a:rPr lang="en-US" sz="2400" dirty="0" err="1"/>
+              <a:t>liệu</a:t>
+            </a:r>
+            <a:r>
+              <a:rPr lang="en-US" sz="2400" dirty="0"/>
+              <a:t> an </a:t>
+            </a:r>
+            <a:r>
+              <a:rPr lang="en-US" sz="2400" dirty="0" err="1"/>
+              <a:t>toàn</a:t>
+            </a:r>
+            <a:r>
+              <a:rPr lang="en-US" sz="2400" dirty="0"/>
+              <a:t> </a:t>
+            </a:r>
+            <a:r>
+              <a:rPr lang="en-US" sz="2400" dirty="0" err="1"/>
+              <a:t>hơn</a:t>
+            </a:r>
+            <a:r>
+              <a:rPr lang="en-US" sz="2400" dirty="0"/>
+              <a:t>.</a:t>
+            </a:r>
           </a:p>
         </p:txBody>
       </p:sp>
@@ -13995,83 +14594,12 @@
           <a:chExt cx="0" cy="0"/>
         </a:xfrm>
       </p:grpSpPr>
-      <p:sp>
+      <p:sp useBgFill="1">
         <p:nvSpPr>
-          <p:cNvPr id="2" name="Tiêu đề 1">
+          <p:cNvPr id="20" name="Rectangle 16">
             <a:extLst>
               <a:ext uri="{FF2B5EF4-FFF2-40B4-BE49-F238E27FC236}">
-                <a16:creationId xmlns:a16="http://schemas.microsoft.com/office/drawing/2014/main" id="{9C6C04ED-DDB2-4366-A2FB-E44E71FB058D}"/>
-              </a:ext>
-            </a:extLst>
-          </p:cNvPr>
-          <p:cNvSpPr>
-            <a:spLocks noGrp="1"/>
-          </p:cNvSpPr>
-          <p:nvPr>
-            <p:ph type="title"/>
-          </p:nvPr>
-        </p:nvSpPr>
-        <p:spPr>
-          <a:xfrm>
-            <a:off x="581192" y="702156"/>
-            <a:ext cx="11029616" cy="1013800"/>
-          </a:xfrm>
-        </p:spPr>
-        <p:txBody>
-          <a:bodyPr>
-            <a:normAutofit/>
-          </a:bodyPr>
-          <a:lstStyle/>
-          <a:p>
-            <a:r>
-              <a:rPr lang="en-US" b="1" dirty="0" err="1"/>
-              <a:t>Công</a:t>
-            </a:r>
-            <a:r>
-              <a:rPr lang="en-US" b="1" dirty="0"/>
-              <a:t> </a:t>
-            </a:r>
-            <a:r>
-              <a:rPr lang="en-US" b="1" dirty="0" err="1"/>
-              <a:t>cụ</a:t>
-            </a:r>
-            <a:r>
-              <a:rPr lang="en-US" b="1" dirty="0"/>
-              <a:t> </a:t>
-            </a:r>
-            <a:r>
-              <a:rPr lang="en-US" b="1" dirty="0" err="1"/>
-              <a:t>mã</a:t>
-            </a:r>
-            <a:r>
-              <a:rPr lang="en-US" b="1" dirty="0"/>
-              <a:t> </a:t>
-            </a:r>
-            <a:r>
-              <a:rPr lang="en-US" b="1" dirty="0" err="1"/>
-              <a:t>hóa</a:t>
-            </a:r>
-            <a:r>
-              <a:rPr lang="en-US" b="1" dirty="0"/>
-              <a:t> </a:t>
-            </a:r>
-            <a:r>
-              <a:rPr lang="en-US" b="1" dirty="0" err="1"/>
-              <a:t>của</a:t>
-            </a:r>
-            <a:r>
-              <a:rPr lang="en-US" b="1" dirty="0"/>
-              <a:t> oracle database</a:t>
-            </a:r>
-          </a:p>
-        </p:txBody>
-      </p:sp>
-      <p:sp>
-        <p:nvSpPr>
-          <p:cNvPr id="12" name="Rectangle 11">
-            <a:extLst>
-              <a:ext uri="{FF2B5EF4-FFF2-40B4-BE49-F238E27FC236}">
-                <a16:creationId xmlns:a16="http://schemas.microsoft.com/office/drawing/2014/main" id="{2E32075D-9299-4657-87D7-B9987B7FDE36}"/>
+                <a16:creationId xmlns:a16="http://schemas.microsoft.com/office/drawing/2014/main" id="{8F404549-B4DC-481C-926C-DED3EF1C585B}"/>
               </a:ext>
               <a:ext uri="{C183D7F6-B498-43B3-948B-1728B52AA6E4}">
                 <adec:decorative xmlns:adec="http://schemas.microsoft.com/office/drawing/2017/decorative" val="1"/>
@@ -14091,19 +14619,14 @@
         </p:nvSpPr>
         <p:spPr>
           <a:xfrm>
-            <a:off x="446533" y="2180496"/>
-            <a:ext cx="5404639" cy="4045683"/>
+            <a:off x="0" y="614406"/>
+            <a:ext cx="12192000" cy="6243593"/>
           </a:xfrm>
           <a:prstGeom prst="rect">
             <a:avLst/>
           </a:prstGeom>
-          <a:solidFill>
-            <a:schemeClr val="bg1"/>
-          </a:solidFill>
-          <a:ln w="38100">
-            <a:solidFill>
-              <a:schemeClr val="accent1"/>
-            </a:solidFill>
+          <a:ln>
+            <a:noFill/>
           </a:ln>
         </p:spPr>
         <p:style>
@@ -14131,35 +14654,136 @@
           </a:p>
         </p:txBody>
       </p:sp>
-      <p:pic>
-        <p:nvPicPr>
-          <p:cNvPr id="7" name="image1.png">
+      <p:sp>
+        <p:nvSpPr>
+          <p:cNvPr id="19" name="Rectangle 18">
             <a:extLst>
               <a:ext uri="{FF2B5EF4-FFF2-40B4-BE49-F238E27FC236}">
-                <a16:creationId xmlns:a16="http://schemas.microsoft.com/office/drawing/2014/main" id="{4BA02378-CB52-4652-9196-59B66AC5C240}"/>
+                <a16:creationId xmlns:a16="http://schemas.microsoft.com/office/drawing/2014/main" id="{1E8FD5CD-351E-4B06-8B78-BD5102D00908}"/>
+              </a:ext>
+              <a:ext uri="{C183D7F6-B498-43B3-948B-1728B52AA6E4}">
+                <adec:decorative xmlns:adec="http://schemas.microsoft.com/office/drawing/2017/decorative" val="1"/>
               </a:ext>
             </a:extLst>
           </p:cNvPr>
-          <p:cNvPicPr>
-            <a:picLocks/>
-          </p:cNvPicPr>
-          <p:nvPr/>
-        </p:nvPicPr>
-        <p:blipFill rotWithShape="1">
-          <a:blip r:embed="rId2"/>
-          <a:srcRect l="5641" r="5963" b="-3"/>
-          <a:stretch/>
-        </p:blipFill>
+          <p:cNvSpPr>
+            <a:spLocks noGrp="1" noRot="1" noChangeAspect="1" noMove="1" noResize="1" noEditPoints="1" noAdjustHandles="1" noChangeArrowheads="1" noChangeShapeType="1" noTextEdit="1"/>
+          </p:cNvSpPr>
+          <p:nvPr>
+            <p:extLst>
+              <p:ext uri="{386F3935-93C4-4BCD-93E2-E3B085C9AB24}">
+                <p16:designElem xmlns:p16="http://schemas.microsoft.com/office/powerpoint/2015/main" val="1"/>
+              </p:ext>
+            </p:extLst>
+          </p:nvPr>
+        </p:nvSpPr>
         <p:spPr>
           <a:xfrm>
-            <a:off x="657225" y="2361056"/>
-            <a:ext cx="4962525" cy="3649219"/>
+            <a:off x="442377" y="614407"/>
+            <a:ext cx="3707477" cy="5611772"/>
           </a:xfrm>
           <a:prstGeom prst="rect">
             <a:avLst/>
           </a:prstGeom>
+          <a:solidFill>
+            <a:schemeClr val="accent1"/>
+          </a:solidFill>
+          <a:ln>
+            <a:noFill/>
+          </a:ln>
+          <a:effectLst/>
         </p:spPr>
-      </p:pic>
+        <p:style>
+          <a:lnRef idx="1">
+            <a:schemeClr val="accent1"/>
+          </a:lnRef>
+          <a:fillRef idx="3">
+            <a:schemeClr val="accent1"/>
+          </a:fillRef>
+          <a:effectRef idx="2">
+            <a:schemeClr val="accent1"/>
+          </a:effectRef>
+          <a:fontRef idx="minor">
+            <a:schemeClr val="lt1"/>
+          </a:fontRef>
+        </p:style>
+      </p:sp>
+      <p:sp>
+        <p:nvSpPr>
+          <p:cNvPr id="2" name="Tiêu đề 1">
+            <a:extLst>
+              <a:ext uri="{FF2B5EF4-FFF2-40B4-BE49-F238E27FC236}">
+                <a16:creationId xmlns:a16="http://schemas.microsoft.com/office/drawing/2014/main" id="{9C6C04ED-DDB2-4366-A2FB-E44E71FB058D}"/>
+              </a:ext>
+            </a:extLst>
+          </p:cNvPr>
+          <p:cNvSpPr>
+            <a:spLocks noGrp="1"/>
+          </p:cNvSpPr>
+          <p:nvPr>
+            <p:ph type="title"/>
+          </p:nvPr>
+        </p:nvSpPr>
+        <p:spPr>
+          <a:xfrm>
+            <a:off x="601255" y="702156"/>
+            <a:ext cx="3409783" cy="1013800"/>
+          </a:xfrm>
+        </p:spPr>
+        <p:txBody>
+          <a:bodyPr>
+            <a:normAutofit/>
+          </a:bodyPr>
+          <a:lstStyle/>
+          <a:p>
+            <a:pPr>
+              <a:lnSpc>
+                <a:spcPct val="90000"/>
+              </a:lnSpc>
+            </a:pPr>
+            <a:r>
+              <a:rPr lang="en-US" sz="2200" b="1" err="1"/>
+              <a:t>Công</a:t>
+            </a:r>
+            <a:r>
+              <a:rPr lang="en-US" sz="2200" b="1"/>
+              <a:t> </a:t>
+            </a:r>
+            <a:r>
+              <a:rPr lang="en-US" sz="2200" b="1" err="1"/>
+              <a:t>cụ</a:t>
+            </a:r>
+            <a:r>
+              <a:rPr lang="en-US" sz="2200" b="1"/>
+              <a:t> </a:t>
+            </a:r>
+            <a:r>
+              <a:rPr lang="en-US" sz="2200" b="1" err="1"/>
+              <a:t>mã</a:t>
+            </a:r>
+            <a:r>
+              <a:rPr lang="en-US" sz="2200" b="1"/>
+              <a:t> </a:t>
+            </a:r>
+            <a:r>
+              <a:rPr lang="en-US" sz="2200" b="1" err="1"/>
+              <a:t>hóa</a:t>
+            </a:r>
+            <a:r>
+              <a:rPr lang="en-US" sz="2200" b="1"/>
+              <a:t> </a:t>
+            </a:r>
+            <a:r>
+              <a:rPr lang="en-US" sz="2200" b="1" err="1"/>
+              <a:t>của</a:t>
+            </a:r>
+            <a:r>
+              <a:rPr lang="en-US" sz="2200" b="1"/>
+              <a:t> oracle database</a:t>
+            </a:r>
+          </a:p>
+        </p:txBody>
+      </p:sp>
       <p:sp>
         <p:nvSpPr>
           <p:cNvPr id="9" name="Content Placeholder 8">
@@ -14178,8 +14802,8 @@
         </p:nvSpPr>
         <p:spPr>
           <a:xfrm>
-            <a:off x="6335805" y="2180496"/>
-            <a:ext cx="5275001" cy="4045683"/>
+            <a:off x="601255" y="1964168"/>
+            <a:ext cx="3409782" cy="4036582"/>
           </a:xfrm>
         </p:spPr>
         <p:txBody>
@@ -14192,260 +14816,554 @@
               <a:buNone/>
             </a:pPr>
             <a:r>
-              <a:rPr lang="vi-VN" sz="2000" dirty="0" err="1"/>
+              <a:rPr lang="vi-VN" dirty="0" err="1">
+                <a:solidFill>
+                  <a:schemeClr val="bg1"/>
+                </a:solidFill>
+              </a:rPr>
               <a:t>Oracle</a:t>
             </a:r>
             <a:r>
-              <a:rPr lang="vi-VN" sz="2000" dirty="0"/>
-              <a:t> </a:t>
-            </a:r>
-            <a:r>
-              <a:rPr lang="vi-VN" sz="2000" dirty="0" err="1"/>
+              <a:rPr lang="vi-VN" dirty="0">
+                <a:solidFill>
+                  <a:schemeClr val="bg1"/>
+                </a:solidFill>
+              </a:rPr>
+              <a:t> </a:t>
+            </a:r>
+            <a:r>
+              <a:rPr lang="vi-VN" dirty="0" err="1">
+                <a:solidFill>
+                  <a:schemeClr val="bg1"/>
+                </a:solidFill>
+              </a:rPr>
               <a:t>Database</a:t>
             </a:r>
             <a:r>
-              <a:rPr lang="vi-VN" sz="2000" dirty="0"/>
-              <a:t> </a:t>
-            </a:r>
-            <a:r>
-              <a:rPr lang="vi-VN" sz="2000" dirty="0" err="1"/>
+              <a:rPr lang="vi-VN" dirty="0">
+                <a:solidFill>
+                  <a:schemeClr val="bg1"/>
+                </a:solidFill>
+              </a:rPr>
+              <a:t> </a:t>
+            </a:r>
+            <a:r>
+              <a:rPr lang="vi-VN" dirty="0" err="1">
+                <a:solidFill>
+                  <a:schemeClr val="bg1"/>
+                </a:solidFill>
+              </a:rPr>
               <a:t>có</a:t>
             </a:r>
             <a:r>
-              <a:rPr lang="vi-VN" sz="2000" dirty="0"/>
+              <a:rPr lang="vi-VN" dirty="0">
+                <a:solidFill>
+                  <a:schemeClr val="bg1"/>
+                </a:solidFill>
+              </a:rPr>
               <a:t> 2 </a:t>
             </a:r>
             <a:r>
-              <a:rPr lang="vi-VN" sz="2000" dirty="0" err="1"/>
+              <a:rPr lang="vi-VN" dirty="0" err="1">
+                <a:solidFill>
+                  <a:schemeClr val="bg1"/>
+                </a:solidFill>
+              </a:rPr>
               <a:t>gói</a:t>
             </a:r>
             <a:r>
-              <a:rPr lang="vi-VN" sz="2000" dirty="0"/>
-              <a:t> </a:t>
-            </a:r>
-            <a:r>
-              <a:rPr lang="vi-VN" sz="2000" dirty="0" err="1"/>
+              <a:rPr lang="vi-VN" dirty="0">
+                <a:solidFill>
+                  <a:schemeClr val="bg1"/>
+                </a:solidFill>
+              </a:rPr>
+              <a:t> </a:t>
+            </a:r>
+            <a:r>
+              <a:rPr lang="vi-VN" dirty="0" err="1">
+                <a:solidFill>
+                  <a:schemeClr val="bg1"/>
+                </a:solidFill>
+              </a:rPr>
               <a:t>ứng</a:t>
             </a:r>
             <a:r>
-              <a:rPr lang="vi-VN" sz="2000" dirty="0"/>
-              <a:t> </a:t>
-            </a:r>
-            <a:r>
-              <a:rPr lang="vi-VN" sz="2000" dirty="0" err="1"/>
+              <a:rPr lang="vi-VN" dirty="0">
+                <a:solidFill>
+                  <a:schemeClr val="bg1"/>
+                </a:solidFill>
+              </a:rPr>
+              <a:t> </a:t>
+            </a:r>
+            <a:r>
+              <a:rPr lang="vi-VN" dirty="0" err="1">
+                <a:solidFill>
+                  <a:schemeClr val="bg1"/>
+                </a:solidFill>
+              </a:rPr>
               <a:t>dụng</a:t>
             </a:r>
             <a:r>
-              <a:rPr lang="vi-VN" sz="2000" dirty="0"/>
-              <a:t> </a:t>
-            </a:r>
-            <a:r>
-              <a:rPr lang="vi-VN" sz="2000" dirty="0" err="1"/>
+              <a:rPr lang="vi-VN" dirty="0">
+                <a:solidFill>
+                  <a:schemeClr val="bg1"/>
+                </a:solidFill>
+              </a:rPr>
+              <a:t> </a:t>
+            </a:r>
+            <a:r>
+              <a:rPr lang="vi-VN" dirty="0" err="1">
+                <a:solidFill>
+                  <a:schemeClr val="bg1"/>
+                </a:solidFill>
+              </a:rPr>
               <a:t>mã</a:t>
             </a:r>
             <a:r>
-              <a:rPr lang="vi-VN" sz="2000" dirty="0"/>
-              <a:t> </a:t>
-            </a:r>
-            <a:r>
-              <a:rPr lang="vi-VN" sz="2000" dirty="0" err="1"/>
+              <a:rPr lang="vi-VN" dirty="0">
+                <a:solidFill>
+                  <a:schemeClr val="bg1"/>
+                </a:solidFill>
+              </a:rPr>
+              <a:t> </a:t>
+            </a:r>
+            <a:r>
+              <a:rPr lang="vi-VN" dirty="0" err="1">
+                <a:solidFill>
+                  <a:schemeClr val="bg1"/>
+                </a:solidFill>
+              </a:rPr>
               <a:t>hóa</a:t>
             </a:r>
             <a:r>
-              <a:rPr lang="vi-VN" sz="2000" dirty="0"/>
+              <a:rPr lang="vi-VN" dirty="0">
+                <a:solidFill>
+                  <a:schemeClr val="bg1"/>
+                </a:solidFill>
+              </a:rPr>
               <a:t>:</a:t>
             </a:r>
-            <a:endParaRPr lang="en-US" sz="2000" dirty="0"/>
+            <a:endParaRPr lang="en-US" dirty="0">
+              <a:solidFill>
+                <a:schemeClr val="bg1"/>
+              </a:solidFill>
+            </a:endParaRPr>
           </a:p>
           <a:p>
             <a:pPr lvl="1"/>
             <a:r>
-              <a:rPr lang="vi-VN" sz="1800" dirty="0"/>
+              <a:rPr lang="vi-VN" dirty="0">
+                <a:solidFill>
+                  <a:schemeClr val="bg1"/>
+                </a:solidFill>
+              </a:rPr>
               <a:t>DBMS_OBFUSCATION_TOOLKIT: </a:t>
             </a:r>
             <a:r>
-              <a:rPr lang="vi-VN" sz="1800" dirty="0" err="1"/>
+              <a:rPr lang="vi-VN" dirty="0" err="1">
+                <a:solidFill>
+                  <a:schemeClr val="bg1"/>
+                </a:solidFill>
+              </a:rPr>
               <a:t>có</a:t>
             </a:r>
             <a:r>
-              <a:rPr lang="vi-VN" sz="1800" dirty="0"/>
-              <a:t> </a:t>
-            </a:r>
-            <a:r>
-              <a:rPr lang="vi-VN" sz="1800" dirty="0" err="1"/>
+              <a:rPr lang="vi-VN" dirty="0">
+                <a:solidFill>
+                  <a:schemeClr val="bg1"/>
+                </a:solidFill>
+              </a:rPr>
+              <a:t> </a:t>
+            </a:r>
+            <a:r>
+              <a:rPr lang="vi-VN" dirty="0" err="1">
+                <a:solidFill>
+                  <a:schemeClr val="bg1"/>
+                </a:solidFill>
+              </a:rPr>
               <a:t>từ</a:t>
             </a:r>
             <a:r>
-              <a:rPr lang="vi-VN" sz="1800" dirty="0"/>
-              <a:t> </a:t>
-            </a:r>
-            <a:r>
-              <a:rPr lang="vi-VN" sz="1800" dirty="0" err="1"/>
+              <a:rPr lang="vi-VN" dirty="0">
+                <a:solidFill>
+                  <a:schemeClr val="bg1"/>
+                </a:solidFill>
+              </a:rPr>
+              <a:t> </a:t>
+            </a:r>
+            <a:r>
+              <a:rPr lang="vi-VN" dirty="0" err="1">
+                <a:solidFill>
+                  <a:schemeClr val="bg1"/>
+                </a:solidFill>
+              </a:rPr>
               <a:t>thời</a:t>
             </a:r>
             <a:r>
-              <a:rPr lang="vi-VN" sz="1800" dirty="0"/>
-              <a:t> khai </a:t>
-            </a:r>
-            <a:r>
-              <a:rPr lang="vi-VN" sz="1800" dirty="0" err="1"/>
-              <a:t>quốc</a:t>
-            </a:r>
-            <a:r>
-              <a:rPr lang="vi-VN" sz="1800" dirty="0"/>
-              <a:t> </a:t>
-            </a:r>
-            <a:r>
-              <a:rPr lang="vi-VN" sz="1800" dirty="0" err="1"/>
+              <a:rPr lang="vi-VN" dirty="0">
+                <a:solidFill>
+                  <a:schemeClr val="bg1"/>
+                </a:solidFill>
+              </a:rPr>
+              <a:t> </a:t>
+            </a:r>
+            <a:r>
+              <a:rPr lang="en-US" dirty="0" err="1">
+                <a:solidFill>
+                  <a:schemeClr val="bg1"/>
+                </a:solidFill>
+              </a:rPr>
+              <a:t>khai</a:t>
+            </a:r>
+            <a:r>
+              <a:rPr lang="en-US">
+                <a:solidFill>
+                  <a:schemeClr val="bg1"/>
+                </a:solidFill>
+              </a:rPr>
+              <a:t> sinh ra</a:t>
+            </a:r>
+            <a:r>
+              <a:rPr lang="vi-VN">
+                <a:solidFill>
+                  <a:schemeClr val="bg1"/>
+                </a:solidFill>
+              </a:rPr>
+              <a:t> </a:t>
+            </a:r>
+            <a:r>
+              <a:rPr lang="vi-VN" dirty="0" err="1">
+                <a:solidFill>
+                  <a:schemeClr val="bg1"/>
+                </a:solidFill>
+              </a:rPr>
               <a:t>Oracle</a:t>
             </a:r>
             <a:r>
-              <a:rPr lang="vi-VN" sz="1800" dirty="0"/>
-              <a:t> </a:t>
-            </a:r>
-            <a:r>
-              <a:rPr lang="vi-VN" sz="1800" dirty="0" err="1"/>
+              <a:rPr lang="vi-VN" dirty="0">
+                <a:solidFill>
+                  <a:schemeClr val="bg1"/>
+                </a:solidFill>
+              </a:rPr>
+              <a:t> </a:t>
+            </a:r>
+            <a:r>
+              <a:rPr lang="vi-VN" dirty="0" err="1">
+                <a:solidFill>
+                  <a:schemeClr val="bg1"/>
+                </a:solidFill>
+              </a:rPr>
               <a:t>đến</a:t>
             </a:r>
             <a:r>
-              <a:rPr lang="vi-VN" sz="1800" dirty="0"/>
-              <a:t> </a:t>
-            </a:r>
-            <a:r>
-              <a:rPr lang="vi-VN" sz="1800" dirty="0" err="1"/>
+              <a:rPr lang="vi-VN" dirty="0">
+                <a:solidFill>
+                  <a:schemeClr val="bg1"/>
+                </a:solidFill>
+              </a:rPr>
+              <a:t> </a:t>
+            </a:r>
+            <a:r>
+              <a:rPr lang="vi-VN" dirty="0" err="1">
+                <a:solidFill>
+                  <a:schemeClr val="bg1"/>
+                </a:solidFill>
+              </a:rPr>
               <a:t>bản</a:t>
             </a:r>
             <a:r>
-              <a:rPr lang="vi-VN" sz="1800" dirty="0"/>
+              <a:rPr lang="vi-VN" dirty="0">
+                <a:solidFill>
+                  <a:schemeClr val="bg1"/>
+                </a:solidFill>
+              </a:rPr>
               <a:t> Oracle9i.</a:t>
             </a:r>
-            <a:endParaRPr lang="en-US" sz="1800" dirty="0"/>
+            <a:endParaRPr lang="en-US" dirty="0">
+              <a:solidFill>
+                <a:schemeClr val="bg1"/>
+              </a:solidFill>
+            </a:endParaRPr>
           </a:p>
           <a:p>
             <a:pPr lvl="1"/>
             <a:r>
-              <a:rPr lang="vi-VN" sz="1800" dirty="0"/>
+              <a:rPr lang="vi-VN" dirty="0">
+                <a:solidFill>
+                  <a:schemeClr val="bg1"/>
+                </a:solidFill>
+              </a:rPr>
               <a:t>DBMS_CRYPTO: </a:t>
             </a:r>
             <a:r>
-              <a:rPr lang="vi-VN" sz="1800" dirty="0" err="1"/>
+              <a:rPr lang="vi-VN" dirty="0" err="1">
+                <a:solidFill>
+                  <a:schemeClr val="bg1"/>
+                </a:solidFill>
+              </a:rPr>
               <a:t>có</a:t>
             </a:r>
             <a:r>
-              <a:rPr lang="vi-VN" sz="1800" dirty="0"/>
-              <a:t> </a:t>
-            </a:r>
-            <a:r>
-              <a:rPr lang="vi-VN" sz="1800" dirty="0" err="1"/>
+              <a:rPr lang="vi-VN" dirty="0">
+                <a:solidFill>
+                  <a:schemeClr val="bg1"/>
+                </a:solidFill>
+              </a:rPr>
+              <a:t> </a:t>
+            </a:r>
+            <a:r>
+              <a:rPr lang="vi-VN" dirty="0" err="1">
+                <a:solidFill>
+                  <a:schemeClr val="bg1"/>
+                </a:solidFill>
+              </a:rPr>
               <a:t>từ</a:t>
             </a:r>
             <a:r>
-              <a:rPr lang="vi-VN" sz="1800" dirty="0"/>
-              <a:t> </a:t>
-            </a:r>
-            <a:r>
-              <a:rPr lang="vi-VN" sz="1800" dirty="0" err="1"/>
+              <a:rPr lang="vi-VN" dirty="0">
+                <a:solidFill>
+                  <a:schemeClr val="bg1"/>
+                </a:solidFill>
+              </a:rPr>
+              <a:t> </a:t>
+            </a:r>
+            <a:r>
+              <a:rPr lang="vi-VN" dirty="0" err="1">
+                <a:solidFill>
+                  <a:schemeClr val="bg1"/>
+                </a:solidFill>
+              </a:rPr>
               <a:t>bản</a:t>
             </a:r>
             <a:r>
-              <a:rPr lang="vi-VN" sz="1800" dirty="0"/>
+              <a:rPr lang="vi-VN" dirty="0">
+                <a:solidFill>
+                  <a:schemeClr val="bg1"/>
+                </a:solidFill>
+              </a:rPr>
               <a:t> 10g, </a:t>
             </a:r>
             <a:r>
-              <a:rPr lang="vi-VN" sz="1800" dirty="0" err="1"/>
+              <a:rPr lang="vi-VN" dirty="0" err="1">
+                <a:solidFill>
+                  <a:schemeClr val="bg1"/>
+                </a:solidFill>
+              </a:rPr>
               <a:t>hỗ</a:t>
             </a:r>
             <a:r>
-              <a:rPr lang="vi-VN" sz="1800" dirty="0"/>
-              <a:t> </a:t>
-            </a:r>
-            <a:r>
-              <a:rPr lang="vi-VN" sz="1800" dirty="0" err="1"/>
+              <a:rPr lang="vi-VN" dirty="0">
+                <a:solidFill>
+                  <a:schemeClr val="bg1"/>
+                </a:solidFill>
+              </a:rPr>
+              <a:t> </a:t>
+            </a:r>
+            <a:r>
+              <a:rPr lang="vi-VN" dirty="0" err="1">
+                <a:solidFill>
+                  <a:schemeClr val="bg1"/>
+                </a:solidFill>
+              </a:rPr>
               <a:t>trợ</a:t>
             </a:r>
             <a:r>
-              <a:rPr lang="vi-VN" sz="1800" dirty="0"/>
+              <a:rPr lang="vi-VN" dirty="0">
+                <a:solidFill>
+                  <a:schemeClr val="bg1"/>
+                </a:solidFill>
+              </a:rPr>
               <a:t> thêm </a:t>
             </a:r>
             <a:r>
-              <a:rPr lang="vi-VN" sz="1800" dirty="0" err="1"/>
+              <a:rPr lang="vi-VN" dirty="0" err="1">
+                <a:solidFill>
+                  <a:schemeClr val="bg1"/>
+                </a:solidFill>
+              </a:rPr>
               <a:t>nhiều</a:t>
             </a:r>
             <a:r>
-              <a:rPr lang="vi-VN" sz="1800" dirty="0"/>
-              <a:t> </a:t>
-            </a:r>
-            <a:r>
-              <a:rPr lang="vi-VN" sz="1800" dirty="0" err="1"/>
+              <a:rPr lang="vi-VN" dirty="0">
+                <a:solidFill>
+                  <a:schemeClr val="bg1"/>
+                </a:solidFill>
+              </a:rPr>
+              <a:t> </a:t>
+            </a:r>
+            <a:r>
+              <a:rPr lang="vi-VN" dirty="0" err="1">
+                <a:solidFill>
+                  <a:schemeClr val="bg1"/>
+                </a:solidFill>
+              </a:rPr>
               <a:t>thuật</a:t>
             </a:r>
             <a:r>
-              <a:rPr lang="vi-VN" sz="1800" dirty="0"/>
-              <a:t> </a:t>
-            </a:r>
-            <a:r>
-              <a:rPr lang="vi-VN" sz="1800" dirty="0" err="1"/>
+              <a:rPr lang="vi-VN" dirty="0">
+                <a:solidFill>
+                  <a:schemeClr val="bg1"/>
+                </a:solidFill>
+              </a:rPr>
+              <a:t> </a:t>
+            </a:r>
+            <a:r>
+              <a:rPr lang="vi-VN" dirty="0" err="1">
+                <a:solidFill>
+                  <a:schemeClr val="bg1"/>
+                </a:solidFill>
+              </a:rPr>
               <a:t>toán</a:t>
             </a:r>
             <a:r>
-              <a:rPr lang="vi-VN" sz="1800" dirty="0"/>
-              <a:t> </a:t>
-            </a:r>
-            <a:r>
-              <a:rPr lang="vi-VN" sz="1800" dirty="0" err="1"/>
+              <a:rPr lang="vi-VN" dirty="0">
+                <a:solidFill>
+                  <a:schemeClr val="bg1"/>
+                </a:solidFill>
+              </a:rPr>
+              <a:t> </a:t>
+            </a:r>
+            <a:r>
+              <a:rPr lang="vi-VN" dirty="0" err="1">
+                <a:solidFill>
+                  <a:schemeClr val="bg1"/>
+                </a:solidFill>
+              </a:rPr>
               <a:t>mã</a:t>
             </a:r>
             <a:r>
-              <a:rPr lang="vi-VN" sz="1800" dirty="0"/>
-              <a:t> </a:t>
-            </a:r>
-            <a:r>
-              <a:rPr lang="vi-VN" sz="1800" dirty="0" err="1"/>
+              <a:rPr lang="vi-VN" dirty="0">
+                <a:solidFill>
+                  <a:schemeClr val="bg1"/>
+                </a:solidFill>
+              </a:rPr>
+              <a:t> </a:t>
+            </a:r>
+            <a:r>
+              <a:rPr lang="vi-VN" dirty="0" err="1">
+                <a:solidFill>
+                  <a:schemeClr val="bg1"/>
+                </a:solidFill>
+              </a:rPr>
               <a:t>hóa</a:t>
             </a:r>
             <a:r>
-              <a:rPr lang="vi-VN" sz="1800" dirty="0"/>
-              <a:t> </a:t>
-            </a:r>
-            <a:r>
-              <a:rPr lang="vi-VN" sz="1800" dirty="0" err="1"/>
+              <a:rPr lang="vi-VN" dirty="0">
+                <a:solidFill>
+                  <a:schemeClr val="bg1"/>
+                </a:solidFill>
+              </a:rPr>
+              <a:t> </a:t>
+            </a:r>
+            <a:r>
+              <a:rPr lang="vi-VN" dirty="0" err="1">
+                <a:solidFill>
+                  <a:schemeClr val="bg1"/>
+                </a:solidFill>
+              </a:rPr>
               <a:t>và</a:t>
             </a:r>
             <a:r>
-              <a:rPr lang="vi-VN" sz="1800" dirty="0"/>
-              <a:t> </a:t>
-            </a:r>
-            <a:r>
-              <a:rPr lang="vi-VN" sz="1800" dirty="0" err="1"/>
+              <a:rPr lang="vi-VN" dirty="0">
+                <a:solidFill>
+                  <a:schemeClr val="bg1"/>
+                </a:solidFill>
+              </a:rPr>
+              <a:t> </a:t>
+            </a:r>
+            <a:r>
+              <a:rPr lang="vi-VN" dirty="0" err="1">
+                <a:solidFill>
+                  <a:schemeClr val="bg1"/>
+                </a:solidFill>
+              </a:rPr>
               <a:t>kiểu</a:t>
             </a:r>
             <a:r>
-              <a:rPr lang="vi-VN" sz="1800" dirty="0"/>
-              <a:t> </a:t>
-            </a:r>
-            <a:r>
-              <a:rPr lang="vi-VN" sz="1800" dirty="0" err="1"/>
+              <a:rPr lang="vi-VN" dirty="0">
+                <a:solidFill>
+                  <a:schemeClr val="bg1"/>
+                </a:solidFill>
+              </a:rPr>
+              <a:t> </a:t>
+            </a:r>
+            <a:r>
+              <a:rPr lang="vi-VN" dirty="0" err="1">
+                <a:solidFill>
+                  <a:schemeClr val="bg1"/>
+                </a:solidFill>
+              </a:rPr>
               <a:t>dữ</a:t>
             </a:r>
             <a:r>
-              <a:rPr lang="vi-VN" sz="1800" dirty="0"/>
-              <a:t> </a:t>
-            </a:r>
-            <a:r>
-              <a:rPr lang="vi-VN" sz="1800" dirty="0" err="1"/>
+              <a:rPr lang="vi-VN" dirty="0">
+                <a:solidFill>
+                  <a:schemeClr val="bg1"/>
+                </a:solidFill>
+              </a:rPr>
+              <a:t> </a:t>
+            </a:r>
+            <a:r>
+              <a:rPr lang="vi-VN" dirty="0" err="1">
+                <a:solidFill>
+                  <a:schemeClr val="bg1"/>
+                </a:solidFill>
+              </a:rPr>
               <a:t>liệu</a:t>
             </a:r>
             <a:r>
-              <a:rPr lang="vi-VN" sz="1800" dirty="0"/>
+              <a:rPr lang="vi-VN" dirty="0">
+                <a:solidFill>
+                  <a:schemeClr val="bg1"/>
+                </a:solidFill>
+              </a:rPr>
               <a:t> LOBS.</a:t>
             </a:r>
-            <a:endParaRPr lang="en-US" sz="1800" dirty="0"/>
-          </a:p>
-          <a:p>
-            <a:endParaRPr lang="en-US" dirty="0"/>
+            <a:endParaRPr lang="en-US" dirty="0">
+              <a:solidFill>
+                <a:schemeClr val="bg1"/>
+              </a:solidFill>
+            </a:endParaRPr>
+          </a:p>
+          <a:p>
+            <a:endParaRPr lang="en-US" dirty="0">
+              <a:solidFill>
+                <a:schemeClr val="bg1"/>
+              </a:solidFill>
+            </a:endParaRPr>
           </a:p>
         </p:txBody>
       </p:sp>
+      <p:pic>
+        <p:nvPicPr>
+          <p:cNvPr id="10" name="image1.png">
+            <a:extLst>
+              <a:ext uri="{FF2B5EF4-FFF2-40B4-BE49-F238E27FC236}">
+                <a16:creationId xmlns:a16="http://schemas.microsoft.com/office/drawing/2014/main" id="{403F429A-27C6-4D2F-B46A-282ED6743499}"/>
+              </a:ext>
+            </a:extLst>
+          </p:cNvPr>
+          <p:cNvPicPr/>
+          <p:nvPr/>
+        </p:nvPicPr>
+        <p:blipFill>
+          <a:blip r:embed="rId2"/>
+          <a:srcRect/>
+          <a:stretch>
+            <a:fillRect/>
+          </a:stretch>
+        </p:blipFill>
+        <p:spPr>
+          <a:xfrm>
+            <a:off x="4592231" y="844062"/>
+            <a:ext cx="6998513" cy="4994030"/>
+          </a:xfrm>
+          <a:prstGeom prst="rect">
+            <a:avLst/>
+          </a:prstGeom>
+          <a:ln/>
+        </p:spPr>
+      </p:pic>
     </p:spTree>
     <p:extLst>
       <p:ext uri="{BB962C8B-B14F-4D97-AF65-F5344CB8AC3E}">

</xml_diff>